<commit_message>
[Terminado] Tree.py: Menu terminado para la presentación.
</commit_message>
<xml_diff>
--- a/doc/Graph.pptx
+++ b/doc/Graph.pptx
@@ -3394,9 +3394,15 @@
             <a:pPr algn="ctr"/>
             <a:r>
               <a:rPr lang="es-ES" dirty="0"/>
+              <a:t>C</a:t>
+            </a:r>
+          </a:p>
+          <a:p>
+            <a:pPr algn="ctr"/>
+            <a:r>
+              <a:rPr lang="es-ES" dirty="0"/>
               <a:t>12</a:t>
             </a:r>
-            <a:endParaRPr lang="es-MX" dirty="0"/>
           </a:p>
         </p:txBody>
       </p:sp>
@@ -3447,6 +3453,13 @@
             <a:pPr algn="ctr"/>
             <a:r>
               <a:rPr lang="es-ES" dirty="0"/>
+              <a:t>A</a:t>
+            </a:r>
+          </a:p>
+          <a:p>
+            <a:pPr algn="ctr"/>
+            <a:r>
+              <a:rPr lang="es-ES" dirty="0"/>
               <a:t>2</a:t>
             </a:r>
             <a:endParaRPr lang="es-MX" dirty="0"/>
@@ -3500,6 +3513,13 @@
             <a:pPr algn="ctr"/>
             <a:r>
               <a:rPr lang="es-ES" dirty="0"/>
+              <a:t>G</a:t>
+            </a:r>
+          </a:p>
+          <a:p>
+            <a:pPr algn="ctr"/>
+            <a:r>
+              <a:rPr lang="es-ES" dirty="0"/>
               <a:t>4</a:t>
             </a:r>
             <a:endParaRPr lang="es-MX" dirty="0"/>
@@ -3553,6 +3573,13 @@
             <a:pPr algn="ctr"/>
             <a:r>
               <a:rPr lang="es-ES" dirty="0"/>
+              <a:t>B</a:t>
+            </a:r>
+          </a:p>
+          <a:p>
+            <a:pPr algn="ctr"/>
+            <a:r>
+              <a:rPr lang="es-ES" dirty="0"/>
               <a:t>6</a:t>
             </a:r>
             <a:endParaRPr lang="es-MX" dirty="0"/>
@@ -3606,6 +3633,13 @@
             <a:pPr algn="ctr"/>
             <a:r>
               <a:rPr lang="es-ES" dirty="0"/>
+              <a:t>E</a:t>
+            </a:r>
+          </a:p>
+          <a:p>
+            <a:pPr algn="ctr"/>
+            <a:r>
+              <a:rPr lang="es-ES" dirty="0"/>
               <a:t>8</a:t>
             </a:r>
             <a:endParaRPr lang="es-MX" dirty="0"/>
@@ -3659,6 +3693,13 @@
             <a:pPr algn="ctr"/>
             <a:r>
               <a:rPr lang="es-ES" dirty="0"/>
+              <a:t>F</a:t>
+            </a:r>
+          </a:p>
+          <a:p>
+            <a:pPr algn="ctr"/>
+            <a:r>
+              <a:rPr lang="es-ES" dirty="0"/>
               <a:t>10</a:t>
             </a:r>
             <a:endParaRPr lang="es-MX" dirty="0"/>
@@ -3712,6 +3753,13 @@
             <a:pPr algn="ctr"/>
             <a:r>
               <a:rPr lang="es-ES" dirty="0"/>
+              <a:t>I</a:t>
+            </a:r>
+          </a:p>
+          <a:p>
+            <a:pPr algn="ctr"/>
+            <a:r>
+              <a:rPr lang="es-ES" dirty="0"/>
               <a:t>16</a:t>
             </a:r>
             <a:endParaRPr lang="es-MX" dirty="0"/>
@@ -3765,6 +3813,13 @@
             <a:pPr algn="ctr"/>
             <a:r>
               <a:rPr lang="es-ES" dirty="0"/>
+              <a:t>D</a:t>
+            </a:r>
+          </a:p>
+          <a:p>
+            <a:pPr algn="ctr"/>
+            <a:r>
+              <a:rPr lang="es-ES" dirty="0"/>
               <a:t>14</a:t>
             </a:r>
             <a:endParaRPr lang="es-MX" dirty="0"/>
@@ -3818,6 +3873,13 @@
             <a:pPr algn="ctr"/>
             <a:r>
               <a:rPr lang="es-ES" dirty="0"/>
+              <a:t>H</a:t>
+            </a:r>
+          </a:p>
+          <a:p>
+            <a:pPr algn="ctr"/>
+            <a:r>
+              <a:rPr lang="es-ES" dirty="0"/>
               <a:t>18</a:t>
             </a:r>
             <a:endParaRPr lang="es-MX" dirty="0"/>
@@ -3867,6 +3929,13 @@
         <p:txBody>
           <a:bodyPr rtlCol="0" anchor="ctr"/>
           <a:lstStyle/>
+          <a:p>
+            <a:pPr algn="ctr"/>
+            <a:r>
+              <a:rPr lang="es-ES" dirty="0"/>
+              <a:t>J</a:t>
+            </a:r>
+          </a:p>
           <a:p>
             <a:pPr algn="ctr"/>
             <a:r>

</xml_diff>